<commit_message>
Update diagram for Logic
</commit_message>
<xml_diff>
--- a/docs/diagrams/LogicComponentClassDiagram.pptx
+++ b/docs/diagrams/LogicComponentClassDiagram.pptx
@@ -212,7 +212,7 @@
           <a:p>
             <a:fld id="{F5CC4B3F-88C1-4FFA-B1B6-F41C21DC6924}" type="datetimeFigureOut">
               <a:rPr lang="en-US" smtClean="0"/>
-              <a:t>7/20/17</a:t>
+              <a:t>11/13/17</a:t>
             </a:fld>
             <a:endParaRPr lang="en-US"/>
           </a:p>
@@ -658,7 +658,7 @@
           <a:p>
             <a:fld id="{78C97017-6FC3-485B-9764-EAC9E56C1D49}" type="datetimeFigureOut">
               <a:rPr lang="en-US" smtClean="0"/>
-              <a:t>7/20/17</a:t>
+              <a:t>11/13/17</a:t>
             </a:fld>
             <a:endParaRPr lang="en-US"/>
           </a:p>
@@ -826,7 +826,7 @@
           <a:p>
             <a:fld id="{78C97017-6FC3-485B-9764-EAC9E56C1D49}" type="datetimeFigureOut">
               <a:rPr lang="en-US" smtClean="0"/>
-              <a:t>7/20/17</a:t>
+              <a:t>11/13/17</a:t>
             </a:fld>
             <a:endParaRPr lang="en-US"/>
           </a:p>
@@ -1004,7 +1004,7 @@
           <a:p>
             <a:fld id="{78C97017-6FC3-485B-9764-EAC9E56C1D49}" type="datetimeFigureOut">
               <a:rPr lang="en-US" smtClean="0"/>
-              <a:t>7/20/17</a:t>
+              <a:t>11/13/17</a:t>
             </a:fld>
             <a:endParaRPr lang="en-US"/>
           </a:p>
@@ -1172,7 +1172,7 @@
           <a:p>
             <a:fld id="{78C97017-6FC3-485B-9764-EAC9E56C1D49}" type="datetimeFigureOut">
               <a:rPr lang="en-US" smtClean="0"/>
-              <a:t>7/20/17</a:t>
+              <a:t>11/13/17</a:t>
             </a:fld>
             <a:endParaRPr lang="en-US"/>
           </a:p>
@@ -1417,7 +1417,7 @@
           <a:p>
             <a:fld id="{78C97017-6FC3-485B-9764-EAC9E56C1D49}" type="datetimeFigureOut">
               <a:rPr lang="en-US" smtClean="0"/>
-              <a:t>7/20/17</a:t>
+              <a:t>11/13/17</a:t>
             </a:fld>
             <a:endParaRPr lang="en-US"/>
           </a:p>
@@ -1702,7 +1702,7 @@
           <a:p>
             <a:fld id="{78C97017-6FC3-485B-9764-EAC9E56C1D49}" type="datetimeFigureOut">
               <a:rPr lang="en-US" smtClean="0"/>
-              <a:t>7/20/17</a:t>
+              <a:t>11/13/17</a:t>
             </a:fld>
             <a:endParaRPr lang="en-US"/>
           </a:p>
@@ -2121,7 +2121,7 @@
           <a:p>
             <a:fld id="{78C97017-6FC3-485B-9764-EAC9E56C1D49}" type="datetimeFigureOut">
               <a:rPr lang="en-US" smtClean="0"/>
-              <a:t>7/20/17</a:t>
+              <a:t>11/13/17</a:t>
             </a:fld>
             <a:endParaRPr lang="en-US"/>
           </a:p>
@@ -2238,7 +2238,7 @@
           <a:p>
             <a:fld id="{78C97017-6FC3-485B-9764-EAC9E56C1D49}" type="datetimeFigureOut">
               <a:rPr lang="en-US" smtClean="0"/>
-              <a:t>7/20/17</a:t>
+              <a:t>11/13/17</a:t>
             </a:fld>
             <a:endParaRPr lang="en-US"/>
           </a:p>
@@ -2333,7 +2333,7 @@
           <a:p>
             <a:fld id="{78C97017-6FC3-485B-9764-EAC9E56C1D49}" type="datetimeFigureOut">
               <a:rPr lang="en-US" smtClean="0"/>
-              <a:t>7/20/17</a:t>
+              <a:t>11/13/17</a:t>
             </a:fld>
             <a:endParaRPr lang="en-US"/>
           </a:p>
@@ -2608,7 +2608,7 @@
           <a:p>
             <a:fld id="{78C97017-6FC3-485B-9764-EAC9E56C1D49}" type="datetimeFigureOut">
               <a:rPr lang="en-US" smtClean="0"/>
-              <a:t>7/20/17</a:t>
+              <a:t>11/13/17</a:t>
             </a:fld>
             <a:endParaRPr lang="en-US"/>
           </a:p>
@@ -2860,7 +2860,7 @@
           <a:p>
             <a:fld id="{78C97017-6FC3-485B-9764-EAC9E56C1D49}" type="datetimeFigureOut">
               <a:rPr lang="en-US" smtClean="0"/>
-              <a:t>7/20/17</a:t>
+              <a:t>11/13/17</a:t>
             </a:fld>
             <a:endParaRPr lang="en-US"/>
           </a:p>
@@ -3071,7 +3071,7 @@
           <a:p>
             <a:fld id="{78C97017-6FC3-485B-9764-EAC9E56C1D49}" type="datetimeFigureOut">
               <a:rPr lang="en-US" smtClean="0"/>
-              <a:t>7/20/17</a:t>
+              <a:t>11/13/17</a:t>
             </a:fld>
             <a:endParaRPr lang="en-US"/>
           </a:p>
@@ -3693,7 +3693,7 @@
         <p:spPr>
           <a:xfrm flipH="1" flipV="1">
             <a:off x="3189583" y="1426447"/>
-            <a:ext cx="4559332" cy="2895973"/>
+            <a:ext cx="4559332" cy="2992888"/>
           </a:xfrm>
           <a:prstGeom prst="bentConnector3">
             <a:avLst>
@@ -3836,7 +3836,7 @@
         </p:nvSpPr>
         <p:spPr>
           <a:xfrm>
-            <a:off x="6976872" y="4149040"/>
+            <a:off x="6976872" y="4245955"/>
             <a:ext cx="772043" cy="346760"/>
           </a:xfrm>
           <a:prstGeom prst="rect">
@@ -3973,15 +3973,13 @@
       <p:cxnSp>
         <p:nvCxnSpPr>
           <p:cNvPr id="18" name="Straight Arrow Connector 110"/>
-          <p:cNvCxnSpPr>
-            <a:stCxn id="12" idx="2"/>
-          </p:cNvCxnSpPr>
+          <p:cNvCxnSpPr/>
           <p:nvPr/>
         </p:nvCxnSpPr>
         <p:spPr>
           <a:xfrm>
-            <a:off x="7362894" y="4495800"/>
-            <a:ext cx="0" cy="281555"/>
+            <a:off x="7362893" y="4593155"/>
+            <a:ext cx="1" cy="184200"/>
           </a:xfrm>
           <a:prstGeom prst="straightConnector1">
             <a:avLst/>
@@ -4263,19 +4261,17 @@
       <p:cxnSp>
         <p:nvCxnSpPr>
           <p:cNvPr id="25" name="Elbow Connector 63"/>
-          <p:cNvCxnSpPr>
-            <a:endCxn id="12" idx="1"/>
-          </p:cNvCxnSpPr>
+          <p:cNvCxnSpPr/>
           <p:nvPr/>
         </p:nvCxnSpPr>
         <p:spPr>
           <a:xfrm>
-            <a:off x="2281833" y="3939492"/>
-            <a:ext cx="4695039" cy="382928"/>
+            <a:off x="2274538" y="3849009"/>
+            <a:ext cx="4702334" cy="744146"/>
           </a:xfrm>
           <a:prstGeom prst="bentConnector3">
             <a:avLst>
-              <a:gd name="adj1" fmla="val -81"/>
+              <a:gd name="adj1" fmla="val -609"/>
             </a:avLst>
           </a:prstGeom>
           <a:ln w="19050">
@@ -4311,7 +4307,7 @@
         </p:nvGrpSpPr>
         <p:grpSpPr>
           <a:xfrm>
-            <a:off x="4597400" y="4341168"/>
+            <a:off x="4591585" y="4417368"/>
             <a:ext cx="889000" cy="230832"/>
             <a:chOff x="2895600" y="807932"/>
             <a:chExt cx="889000" cy="230832"/>
@@ -5062,7 +5058,7 @@
         </p:nvSpPr>
         <p:spPr>
           <a:xfrm flipV="1">
-            <a:off x="7227643" y="3980475"/>
+            <a:off x="7227643" y="4055704"/>
             <a:ext cx="270504" cy="175523"/>
           </a:xfrm>
           <a:prstGeom prst="triangle">
@@ -5119,8 +5115,8 @@
         </p:nvCxnSpPr>
         <p:spPr>
           <a:xfrm rot="5400000" flipH="1" flipV="1">
-            <a:off x="6916385" y="3533423"/>
-            <a:ext cx="893563" cy="542"/>
+            <a:off x="6878770" y="3571037"/>
+            <a:ext cx="968792" cy="542"/>
           </a:xfrm>
           <a:prstGeom prst="bentConnector3">
             <a:avLst>
@@ -5517,7 +5513,7 @@
           <p:cNvPr id="97" name="Rectangle 96">
             <a:extLst>
               <a:ext uri="{FF2B5EF4-FFF2-40B4-BE49-F238E27FC236}">
-                <a16:creationId xmlns="" xmlns:a16="http://schemas.microsoft.com/office/drawing/2014/main" id="{AADE6A0C-89AB-467B-8CEA-5FCF36CE0D21}"/>
+                <a16:creationId xmlns:a16="http://schemas.microsoft.com/office/drawing/2014/main" xmlns="" id="{AADE6A0C-89AB-467B-8CEA-5FCF36CE0D21}"/>
               </a:ext>
             </a:extLst>
           </p:cNvPr>
@@ -6374,6 +6370,103 @@
           </a:p>
         </p:txBody>
       </p:sp>
+      <p:sp>
+        <p:nvSpPr>
+          <p:cNvPr id="64" name="Rectangle 62"/>
+          <p:cNvSpPr/>
+          <p:nvPr/>
+        </p:nvSpPr>
+        <p:spPr>
+          <a:xfrm>
+            <a:off x="2432752" y="4189587"/>
+            <a:ext cx="805984" cy="346760"/>
+          </a:xfrm>
+          <a:prstGeom prst="rect">
+            <a:avLst/>
+          </a:prstGeom>
+          <a:solidFill>
+            <a:srgbClr val="0070C0"/>
+          </a:solidFill>
+          <a:ln w="19050">
+            <a:solidFill>
+              <a:srgbClr val="0070C0"/>
+            </a:solidFill>
+          </a:ln>
+          <a:effectLst/>
+        </p:spPr>
+        <p:style>
+          <a:lnRef idx="1">
+            <a:schemeClr val="accent2"/>
+          </a:lnRef>
+          <a:fillRef idx="2">
+            <a:schemeClr val="accent2"/>
+          </a:fillRef>
+          <a:effectRef idx="1">
+            <a:schemeClr val="accent2"/>
+          </a:effectRef>
+          <a:fontRef idx="minor">
+            <a:schemeClr val="dk1"/>
+          </a:fontRef>
+        </p:style>
+        <p:txBody>
+          <a:bodyPr rtlCol="0" anchor="ctr"/>
+          <a:lstStyle/>
+          <a:p>
+            <a:pPr algn="ctr"/>
+            <a:r>
+              <a:rPr lang="en-US" sz="1050" dirty="0" smtClean="0">
+                <a:solidFill>
+                  <a:schemeClr val="bg1"/>
+                </a:solidFill>
+              </a:rPr>
+              <a:t>Auto-Complete</a:t>
+            </a:r>
+            <a:endParaRPr lang="en-US" sz="1050" dirty="0">
+              <a:solidFill>
+                <a:schemeClr val="bg1"/>
+              </a:solidFill>
+            </a:endParaRPr>
+          </a:p>
+        </p:txBody>
+      </p:sp>
+      <p:cxnSp>
+        <p:nvCxnSpPr>
+          <p:cNvPr id="65" name="Straight Arrow Connector 57"/>
+          <p:cNvCxnSpPr/>
+          <p:nvPr/>
+        </p:nvCxnSpPr>
+        <p:spPr>
+          <a:xfrm>
+            <a:off x="2561249" y="3945655"/>
+            <a:ext cx="2022" cy="240622"/>
+          </a:xfrm>
+          <a:prstGeom prst="straightConnector1">
+            <a:avLst/>
+          </a:prstGeom>
+          <a:ln w="19050">
+            <a:solidFill>
+              <a:srgbClr val="0070C0"/>
+            </a:solidFill>
+            <a:headEnd type="none" w="med" len="med"/>
+            <a:tailEnd type="arrow" w="med" len="med"/>
+          </a:ln>
+          <a:effectLst/>
+        </p:spPr>
+        <p:style>
+          <a:lnRef idx="1">
+            <a:schemeClr val="accent2"/>
+          </a:lnRef>
+          <a:fillRef idx="2">
+            <a:schemeClr val="accent2"/>
+          </a:fillRef>
+          <a:effectRef idx="1">
+            <a:schemeClr val="accent2"/>
+          </a:effectRef>
+          <a:fontRef idx="minor">
+            <a:schemeClr val="dk1"/>
+          </a:fontRef>
+        </p:style>
+      </p:cxnSp>
     </p:spTree>
     <p:extLst>
       <p:ext uri="{BB962C8B-B14F-4D97-AF65-F5344CB8AC3E}">

</xml_diff>